<commit_message>
lidt ændringer til pp og lidt til dataclassen
</commit_message>
<xml_diff>
--- a/pitch/enchancedPP.pptx
+++ b/pitch/enchancedPP.pptx
@@ -9615,7 +9615,7 @@
             </a:r>
             <a:r>
               <a:rPr lang="da-DK" dirty="0"/>
-              <a:t> to image models</a:t>
+              <a:t>-to-image models</a:t>
             </a:r>
           </a:p>
           <a:p>
@@ -9645,7 +9645,7 @@
             </a:r>
             <a:r>
               <a:rPr lang="da-DK" dirty="0"/>
-              <a:t> image to </a:t>
+              <a:t> image-to-</a:t>
             </a:r>
             <a:r>
               <a:rPr lang="da-DK" dirty="0" err="1"/>
@@ -9705,7 +9705,7 @@
             </a:r>
             <a:r>
               <a:rPr lang="da-DK" dirty="0"/>
-              <a:t>?</a:t>
+              <a:t>. </a:t>
             </a:r>
           </a:p>
           <a:p>
@@ -9715,7 +9715,54 @@
             </a:pPr>
             <a:r>
               <a:rPr lang="da-DK" dirty="0"/>
-              <a:t>List go on..</a:t>
+              <a:t>All kinds of </a:t>
+            </a:r>
+            <a:r>
+              <a:rPr lang="da-DK" dirty="0" err="1"/>
+              <a:t>captions</a:t>
+            </a:r>
+            <a:r>
+              <a:rPr lang="da-DK" dirty="0"/>
+              <a:t> for website-images </a:t>
+            </a:r>
+            <a:r>
+              <a:rPr lang="da-DK" dirty="0" err="1"/>
+              <a:t>can</a:t>
+            </a:r>
+            <a:r>
+              <a:rPr lang="da-DK" dirty="0"/>
+              <a:t> </a:t>
+            </a:r>
+            <a:r>
+              <a:rPr lang="da-DK" dirty="0" err="1"/>
+              <a:t>be</a:t>
+            </a:r>
+            <a:r>
+              <a:rPr lang="da-DK" dirty="0"/>
+              <a:t> </a:t>
+            </a:r>
+            <a:r>
+              <a:rPr lang="da-DK" dirty="0" err="1"/>
+              <a:t>automized</a:t>
+            </a:r>
+            <a:endParaRPr lang="da-DK" dirty="0"/>
+          </a:p>
+          <a:p>
+            <a:pPr marL="342900" indent="-342900">
+              <a:buFont typeface="Arial" panose="020B0604020202020204" pitchFamily="34" charset="0"/>
+              <a:buChar char="•"/>
+            </a:pPr>
+            <a:r>
+              <a:rPr lang="da-DK" dirty="0"/>
+              <a:t>List </a:t>
+            </a:r>
+            <a:r>
+              <a:rPr lang="da-DK" dirty="0" err="1"/>
+              <a:t>goes</a:t>
+            </a:r>
+            <a:r>
+              <a:rPr lang="da-DK" dirty="0"/>
+              <a:t> on..</a:t>
             </a:r>
           </a:p>
           <a:p>
@@ -9927,10 +9974,44 @@
             <a:endParaRPr lang="da-DK" dirty="0"/>
           </a:p>
           <a:p>
+            <a:pPr rtl="0"/>
             <a:endParaRPr lang="da-DK" dirty="0"/>
           </a:p>
-        </p:txBody>
-      </p:sp>
+          <a:p>
+            <a:endParaRPr lang="da-DK" dirty="0"/>
+          </a:p>
+        </p:txBody>
+      </p:sp>
+      <p:pic>
+        <p:nvPicPr>
+          <p:cNvPr id="3" name="Billede 2">
+            <a:extLst>
+              <a:ext uri="{FF2B5EF4-FFF2-40B4-BE49-F238E27FC236}">
+                <a16:creationId xmlns:a16="http://schemas.microsoft.com/office/drawing/2014/main" id="{74A9EDDF-A139-968F-D194-5912C614787D}"/>
+              </a:ext>
+            </a:extLst>
+          </p:cNvPr>
+          <p:cNvPicPr>
+            <a:picLocks noChangeAspect="1"/>
+          </p:cNvPicPr>
+          <p:nvPr/>
+        </p:nvPicPr>
+        <p:blipFill>
+          <a:blip r:embed="rId4"/>
+          <a:stretch>
+            <a:fillRect/>
+          </a:stretch>
+        </p:blipFill>
+        <p:spPr>
+          <a:xfrm>
+            <a:off x="1413892" y="3356992"/>
+            <a:ext cx="3032513" cy="3032513"/>
+          </a:xfrm>
+          <a:prstGeom prst="rect">
+            <a:avLst/>
+          </a:prstGeom>
+        </p:spPr>
+      </p:pic>
     </p:spTree>
     <p:custDataLst>
       <p:tags r:id="rId1"/>
@@ -10018,20 +10099,9 @@
           <a:bodyPr/>
           <a:lstStyle/>
           <a:p>
-            <a:r>
-              <a:rPr lang="da-DK" dirty="0"/>
-              <a:t>*indsæt flot billede tegnet af </a:t>
-            </a:r>
-            <a:r>
-              <a:rPr lang="da-DK" dirty="0" err="1"/>
-              <a:t>Simsefar</a:t>
-            </a:r>
-            <a:r>
-              <a:rPr lang="da-DK" dirty="0"/>
-              <a:t>*</a:t>
-            </a:r>
-          </a:p>
-          <a:p>
+            <a:pPr>
+              <a:buNone/>
+            </a:pPr>
             <a:endParaRPr lang="da-DK" dirty="0"/>
           </a:p>
         </p:txBody>
@@ -10097,7 +10167,7 @@
         </p:blipFill>
         <p:spPr>
           <a:xfrm>
-            <a:off x="2133972" y="1778031"/>
+            <a:off x="1485900" y="1764958"/>
             <a:ext cx="8152025" cy="4521367"/>
           </a:xfrm>
           <a:prstGeom prst="rect">
@@ -10193,6 +10263,10 @@
           <a:bodyPr/>
           <a:lstStyle/>
           <a:p>
+            <a:pPr marL="457200" indent="-457200">
+              <a:buFont typeface="Arial" panose="020B0604020202020204" pitchFamily="34" charset="0"/>
+              <a:buChar char="•"/>
+            </a:pPr>
             <a:r>
               <a:rPr lang="da-DK" dirty="0"/>
               <a:t>Training the R-CNN by </a:t>
@@ -10203,13 +10277,127 @@
             </a:r>
             <a:r>
               <a:rPr lang="da-DK" dirty="0"/>
-              <a:t>. </a:t>
-            </a:r>
-          </a:p>
-          <a:p>
+              <a:t> -&gt; </a:t>
+            </a:r>
+            <a:r>
+              <a:rPr lang="da-DK" dirty="0" err="1"/>
+              <a:t>finetuning</a:t>
+            </a:r>
+            <a:r>
+              <a:rPr lang="da-DK" dirty="0"/>
+              <a:t> </a:t>
+            </a:r>
+            <a:r>
+              <a:rPr lang="da-DK" dirty="0" err="1"/>
+              <a:t>existing</a:t>
+            </a:r>
+            <a:r>
+              <a:rPr lang="da-DK" dirty="0"/>
+              <a:t> CNN </a:t>
+            </a:r>
+            <a:r>
+              <a:rPr lang="da-DK" dirty="0" err="1"/>
+              <a:t>instead</a:t>
+            </a:r>
             <a:endParaRPr lang="da-DK" dirty="0"/>
           </a:p>
           <a:p>
+            <a:pPr marL="457200" indent="-457200">
+              <a:buFont typeface="Arial" panose="020B0604020202020204" pitchFamily="34" charset="0"/>
+              <a:buChar char="•"/>
+            </a:pPr>
+            <a:endParaRPr lang="da-DK" dirty="0"/>
+          </a:p>
+          <a:p>
+            <a:pPr marL="457200" indent="-457200">
+              <a:buFont typeface="Arial" panose="020B0604020202020204" pitchFamily="34" charset="0"/>
+              <a:buChar char="•"/>
+            </a:pPr>
+            <a:r>
+              <a:rPr lang="da-DK" dirty="0"/>
+              <a:t>How to </a:t>
+            </a:r>
+            <a:r>
+              <a:rPr lang="da-DK" dirty="0" err="1"/>
+              <a:t>evaluate</a:t>
+            </a:r>
+            <a:r>
+              <a:rPr lang="da-DK" dirty="0"/>
+              <a:t> performance? </a:t>
+            </a:r>
+            <a:r>
+              <a:rPr lang="da-DK" dirty="0" err="1"/>
+              <a:t>Weighting</a:t>
+            </a:r>
+            <a:r>
+              <a:rPr lang="da-DK" dirty="0"/>
+              <a:t> of </a:t>
+            </a:r>
+            <a:r>
+              <a:rPr lang="da-DK" dirty="0" err="1"/>
+              <a:t>certain</a:t>
+            </a:r>
+            <a:r>
+              <a:rPr lang="da-DK" dirty="0"/>
+              <a:t> </a:t>
+            </a:r>
+            <a:r>
+              <a:rPr lang="da-DK" dirty="0" err="1"/>
+              <a:t>words</a:t>
+            </a:r>
+            <a:r>
+              <a:rPr lang="da-DK" dirty="0"/>
+              <a:t>?</a:t>
+            </a:r>
+          </a:p>
+          <a:p>
+            <a:pPr marL="457200" indent="-457200">
+              <a:buFont typeface="Arial" panose="020B0604020202020204" pitchFamily="34" charset="0"/>
+              <a:buChar char="•"/>
+            </a:pPr>
+            <a:endParaRPr lang="da-DK" dirty="0"/>
+          </a:p>
+          <a:p>
+            <a:pPr marL="457200" indent="-457200">
+              <a:buFont typeface="Arial" panose="020B0604020202020204" pitchFamily="34" charset="0"/>
+              <a:buChar char="•"/>
+            </a:pPr>
+            <a:r>
+              <a:rPr lang="da-DK" dirty="0" err="1"/>
+              <a:t>Possible</a:t>
+            </a:r>
+            <a:r>
+              <a:rPr lang="da-DK" dirty="0"/>
+              <a:t> </a:t>
+            </a:r>
+            <a:r>
+              <a:rPr lang="da-DK" dirty="0" err="1"/>
+              <a:t>biases</a:t>
+            </a:r>
+            <a:r>
+              <a:rPr lang="da-DK" dirty="0"/>
+              <a:t> of </a:t>
+            </a:r>
+            <a:r>
+              <a:rPr lang="da-DK" dirty="0" err="1"/>
+              <a:t>our</a:t>
+            </a:r>
+            <a:r>
+              <a:rPr lang="da-DK" dirty="0"/>
+              <a:t> model?</a:t>
+            </a:r>
+          </a:p>
+          <a:p>
+            <a:pPr>
+              <a:buNone/>
+            </a:pPr>
+            <a:endParaRPr lang="da-DK" dirty="0"/>
+          </a:p>
+          <a:p>
+            <a:pPr marL="457200" indent="-457200">
+              <a:buFont typeface="Arial" panose="020B0604020202020204" pitchFamily="34" charset="0"/>
+              <a:buChar char="•"/>
+            </a:pPr>
             <a:r>
               <a:rPr lang="da-DK" dirty="0" err="1"/>
               <a:t>Enough</a:t>
@@ -10218,6 +10406,55 @@
               <a:rPr lang="da-DK" dirty="0"/>
               <a:t> data?</a:t>
             </a:r>
+          </a:p>
+          <a:p>
+            <a:pPr>
+              <a:buNone/>
+            </a:pPr>
+            <a:endParaRPr lang="da-DK" dirty="0"/>
+          </a:p>
+          <a:p>
+            <a:pPr marL="457200" indent="-457200">
+              <a:buFont typeface="Arial" panose="020B0604020202020204" pitchFamily="34" charset="0"/>
+              <a:buChar char="•"/>
+            </a:pPr>
+            <a:r>
+              <a:rPr lang="da-DK" dirty="0"/>
+              <a:t>The time </a:t>
+            </a:r>
+            <a:r>
+              <a:rPr lang="da-DK" dirty="0" err="1"/>
+              <a:t>spent</a:t>
+            </a:r>
+            <a:r>
+              <a:rPr lang="da-DK" dirty="0"/>
+              <a:t> to </a:t>
+            </a:r>
+            <a:r>
+              <a:rPr lang="da-DK" dirty="0" err="1"/>
+              <a:t>train</a:t>
+            </a:r>
+            <a:r>
+              <a:rPr lang="da-DK" dirty="0"/>
+              <a:t> model? Cluster </a:t>
+            </a:r>
+            <a:r>
+              <a:rPr lang="da-DK" dirty="0" err="1"/>
+              <a:t>PC’s</a:t>
+            </a:r>
+            <a:r>
+              <a:rPr lang="da-DK" dirty="0"/>
+              <a:t> on AU-campus</a:t>
+            </a:r>
+          </a:p>
+          <a:p>
+            <a:endParaRPr lang="da-DK" dirty="0"/>
+          </a:p>
+          <a:p>
+            <a:endParaRPr lang="da-DK" dirty="0"/>
+          </a:p>
+          <a:p>
+            <a:endParaRPr lang="da-DK" dirty="0"/>
           </a:p>
           <a:p>
             <a:endParaRPr lang="da-DK" dirty="0"/>
@@ -10344,6 +10581,10 @@
           <a:bodyPr/>
           <a:lstStyle/>
           <a:p>
+            <a:pPr marL="342900" indent="-342900">
+              <a:buFont typeface="Arial" panose="020B0604020202020204" pitchFamily="34" charset="0"/>
+              <a:buChar char="•"/>
+            </a:pPr>
             <a:r>
               <a:rPr lang="da-DK" dirty="0" err="1"/>
               <a:t>Create</a:t>
@@ -10368,6 +10609,164 @@
               <a:rPr lang="da-DK" dirty="0"/>
               <a:t> model</a:t>
             </a:r>
+          </a:p>
+          <a:p>
+            <a:pPr>
+              <a:buNone/>
+            </a:pPr>
+            <a:endParaRPr lang="da-DK" dirty="0"/>
+          </a:p>
+          <a:p>
+            <a:pPr marL="342900" indent="-342900">
+              <a:buFont typeface="Arial" panose="020B0604020202020204" pitchFamily="34" charset="0"/>
+              <a:buChar char="•"/>
+            </a:pPr>
+            <a:endParaRPr lang="da-DK" dirty="0"/>
+          </a:p>
+          <a:p>
+            <a:pPr marL="342900" indent="-342900">
+              <a:buFont typeface="Arial" panose="020B0604020202020204" pitchFamily="34" charset="0"/>
+              <a:buChar char="•"/>
+            </a:pPr>
+            <a:r>
+              <a:rPr lang="da-DK" dirty="0" err="1"/>
+              <a:t>Publish</a:t>
+            </a:r>
+            <a:r>
+              <a:rPr lang="da-DK" dirty="0"/>
+              <a:t> on </a:t>
+            </a:r>
+            <a:r>
+              <a:rPr lang="da-DK" dirty="0" err="1"/>
+              <a:t>Github</a:t>
+            </a:r>
+            <a:r>
+              <a:rPr lang="da-DK" dirty="0"/>
+              <a:t> for </a:t>
+            </a:r>
+            <a:r>
+              <a:rPr lang="da-DK" dirty="0" err="1"/>
+              <a:t>other</a:t>
+            </a:r>
+            <a:r>
+              <a:rPr lang="da-DK" dirty="0"/>
+              <a:t> </a:t>
+            </a:r>
+            <a:r>
+              <a:rPr lang="da-DK" dirty="0" err="1"/>
+              <a:t>people</a:t>
+            </a:r>
+            <a:r>
+              <a:rPr lang="da-DK" dirty="0"/>
+              <a:t> to </a:t>
+            </a:r>
+            <a:r>
+              <a:rPr lang="da-DK" dirty="0" err="1"/>
+              <a:t>see</a:t>
+            </a:r>
+            <a:endParaRPr lang="da-DK" dirty="0"/>
+          </a:p>
+          <a:p>
+            <a:pPr marL="342900" indent="-342900">
+              <a:buFont typeface="Arial" panose="020B0604020202020204" pitchFamily="34" charset="0"/>
+              <a:buChar char="•"/>
+            </a:pPr>
+            <a:endParaRPr lang="da-DK" dirty="0"/>
+          </a:p>
+          <a:p>
+            <a:pPr marL="342900" indent="-342900">
+              <a:buFont typeface="Arial" panose="020B0604020202020204" pitchFamily="34" charset="0"/>
+              <a:buChar char="•"/>
+            </a:pPr>
+            <a:endParaRPr lang="da-DK" dirty="0"/>
+          </a:p>
+          <a:p>
+            <a:pPr marL="342900" indent="-342900">
+              <a:buFont typeface="Arial" panose="020B0604020202020204" pitchFamily="34" charset="0"/>
+              <a:buChar char="•"/>
+            </a:pPr>
+            <a:r>
+              <a:rPr lang="da-DK" dirty="0" err="1"/>
+              <a:t>Compare</a:t>
+            </a:r>
+            <a:r>
+              <a:rPr lang="da-DK" dirty="0"/>
+              <a:t> with </a:t>
+            </a:r>
+            <a:r>
+              <a:rPr lang="da-DK" dirty="0" err="1"/>
+              <a:t>similar</a:t>
+            </a:r>
+            <a:r>
+              <a:rPr lang="da-DK" dirty="0"/>
+              <a:t> models in the </a:t>
+            </a:r>
+            <a:r>
+              <a:rPr lang="da-DK" dirty="0" err="1"/>
+              <a:t>existing</a:t>
+            </a:r>
+            <a:r>
+              <a:rPr lang="da-DK" dirty="0"/>
+              <a:t> </a:t>
+            </a:r>
+            <a:r>
+              <a:rPr lang="da-DK" dirty="0" err="1"/>
+              <a:t>literature</a:t>
+            </a:r>
+            <a:endParaRPr lang="da-DK" dirty="0"/>
+          </a:p>
+          <a:p>
+            <a:pPr marL="342900" indent="-342900">
+              <a:buFont typeface="Arial" panose="020B0604020202020204" pitchFamily="34" charset="0"/>
+              <a:buChar char="•"/>
+            </a:pPr>
+            <a:endParaRPr lang="da-DK" dirty="0"/>
+          </a:p>
+          <a:p>
+            <a:pPr marL="342900" indent="-342900">
+              <a:buFont typeface="Arial" panose="020B0604020202020204" pitchFamily="34" charset="0"/>
+              <a:buChar char="•"/>
+            </a:pPr>
+            <a:endParaRPr lang="da-DK" dirty="0"/>
+          </a:p>
+          <a:p>
+            <a:pPr marL="342900" indent="-342900">
+              <a:buFont typeface="Arial" panose="020B0604020202020204" pitchFamily="34" charset="0"/>
+              <a:buChar char="•"/>
+            </a:pPr>
+            <a:r>
+              <a:rPr lang="da-DK" dirty="0"/>
+              <a:t>Test it on </a:t>
+            </a:r>
+            <a:r>
+              <a:rPr lang="da-DK" dirty="0" err="1"/>
+              <a:t>our</a:t>
+            </a:r>
+            <a:r>
+              <a:rPr lang="da-DK" dirty="0"/>
+              <a:t> </a:t>
+            </a:r>
+            <a:r>
+              <a:rPr lang="da-DK" dirty="0" err="1"/>
+              <a:t>own</a:t>
+            </a:r>
+            <a:r>
+              <a:rPr lang="da-DK" dirty="0"/>
+              <a:t> super cool images </a:t>
+            </a:r>
+            <a:r>
+              <a:rPr lang="da-DK" dirty="0">
+                <a:sym typeface="Wingdings" panose="05000000000000000000" pitchFamily="2" charset="2"/>
+              </a:rPr>
+              <a:t></a:t>
+            </a:r>
+            <a:endParaRPr lang="da-DK" dirty="0"/>
+          </a:p>
+          <a:p>
+            <a:endParaRPr lang="da-DK" dirty="0"/>
+          </a:p>
+          <a:p>
+            <a:endParaRPr lang="da-DK" dirty="0"/>
           </a:p>
         </p:txBody>
       </p:sp>

</xml_diff>